<commit_message>
add html lesson02 & html ide
</commit_message>
<xml_diff>
--- a/Lesson/HTML/1.pptx
+++ b/Lesson/HTML/1.pptx
@@ -132,7 +132,7 @@
   </p:defaultTextStyle>
   <p:extLst>
     <p:ext uri="{EFAFB233-063F-42B5-8137-9DF3F51BA10A}">
-      <p15:sldGuideLst xmlns:p15="http://schemas.microsoft.com/office/powerpoint/2012/main" xmlns=""/>
+      <p15:sldGuideLst xmlns="" xmlns:p15="http://schemas.microsoft.com/office/powerpoint/2012/main"/>
     </p:ext>
   </p:extLst>
 </p:presentation>
@@ -12379,7 +12379,7 @@
           <p:cNvPr id="2" name="标题 1">
             <a:extLst>
               <a:ext uri="{FF2B5EF4-FFF2-40B4-BE49-F238E27FC236}">
-                <a16:creationId xmlns:a16="http://schemas.microsoft.com/office/drawing/2014/main" xmlns="" id="{693B867F-EEA2-CF43-82FF-C518D4DE836D}"/>
+                <a16:creationId xmlns="" xmlns:a16="http://schemas.microsoft.com/office/drawing/2014/main" id="{693B867F-EEA2-CF43-82FF-C518D4DE836D}"/>
               </a:ext>
             </a:extLst>
           </p:cNvPr>
@@ -12416,6 +12416,13 @@
   <p:clrMapOvr>
     <a:masterClrMapping/>
   </p:clrMapOvr>
+  <p:timing>
+    <p:tnLst>
+      <p:par>
+        <p:cTn id="1" dur="indefinite" restart="never" nodeType="tmRoot"/>
+      </p:par>
+    </p:tnLst>
+  </p:timing>
 </p:sld>
 </file>
 
@@ -12441,7 +12448,7 @@
           <p:cNvPr id="2" name="标题 1">
             <a:extLst>
               <a:ext uri="{FF2B5EF4-FFF2-40B4-BE49-F238E27FC236}">
-                <a16:creationId xmlns:a16="http://schemas.microsoft.com/office/drawing/2014/main" xmlns="" id="{77946559-D806-2D42-9107-4A268F47D2E9}"/>
+                <a16:creationId xmlns="" xmlns:a16="http://schemas.microsoft.com/office/drawing/2014/main" id="{77946559-D806-2D42-9107-4A268F47D2E9}"/>
               </a:ext>
             </a:extLst>
           </p:cNvPr>
@@ -12506,7 +12513,7 @@
           <p:cNvPr id="3" name="内容占位符 2">
             <a:extLst>
               <a:ext uri="{FF2B5EF4-FFF2-40B4-BE49-F238E27FC236}">
-                <a16:creationId xmlns:a16="http://schemas.microsoft.com/office/drawing/2014/main" xmlns="" id="{9A69317C-7447-1344-88E4-87CB169E593B}"/>
+                <a16:creationId xmlns="" xmlns:a16="http://schemas.microsoft.com/office/drawing/2014/main" id="{9A69317C-7447-1344-88E4-87CB169E593B}"/>
               </a:ext>
             </a:extLst>
           </p:cNvPr>
@@ -12654,7 +12661,7 @@
           <p:cNvPr id="2" name="标题 1">
             <a:extLst>
               <a:ext uri="{FF2B5EF4-FFF2-40B4-BE49-F238E27FC236}">
-                <a16:creationId xmlns:a16="http://schemas.microsoft.com/office/drawing/2014/main" xmlns="" id="{62E128FB-BA31-9042-A588-71E51DA28856}"/>
+                <a16:creationId xmlns="" xmlns:a16="http://schemas.microsoft.com/office/drawing/2014/main" id="{62E128FB-BA31-9042-A588-71E51DA28856}"/>
               </a:ext>
             </a:extLst>
           </p:cNvPr>
@@ -12711,7 +12718,7 @@
           <p:cNvPr id="3" name="内容占位符 2">
             <a:extLst>
               <a:ext uri="{FF2B5EF4-FFF2-40B4-BE49-F238E27FC236}">
-                <a16:creationId xmlns:a16="http://schemas.microsoft.com/office/drawing/2014/main" xmlns="" id="{64FAE74C-6BDF-1745-B3BA-9DBF7BDC2F68}"/>
+                <a16:creationId xmlns="" xmlns:a16="http://schemas.microsoft.com/office/drawing/2014/main" id="{64FAE74C-6BDF-1745-B3BA-9DBF7BDC2F68}"/>
               </a:ext>
             </a:extLst>
           </p:cNvPr>
@@ -12799,7 +12806,7 @@
           <p:cNvPr id="2" name="标题 1">
             <a:extLst>
               <a:ext uri="{FF2B5EF4-FFF2-40B4-BE49-F238E27FC236}">
-                <a16:creationId xmlns:a16="http://schemas.microsoft.com/office/drawing/2014/main" xmlns="" id="{6234A016-D5A9-4F42-96C5-A97FCB9250C3}"/>
+                <a16:creationId xmlns="" xmlns:a16="http://schemas.microsoft.com/office/drawing/2014/main" id="{6234A016-D5A9-4F42-96C5-A97FCB9250C3}"/>
               </a:ext>
             </a:extLst>
           </p:cNvPr>
@@ -12827,7 +12834,7 @@
           <p:cNvPr id="4" name="内容占位符 3">
             <a:extLst>
               <a:ext uri="{FF2B5EF4-FFF2-40B4-BE49-F238E27FC236}">
-                <a16:creationId xmlns:a16="http://schemas.microsoft.com/office/drawing/2014/main" xmlns="" id="{211134E5-B98C-094E-BD4D-BB59EDD7CAB9}"/>
+                <a16:creationId xmlns="" xmlns:a16="http://schemas.microsoft.com/office/drawing/2014/main" id="{211134E5-B98C-094E-BD4D-BB59EDD7CAB9}"/>
               </a:ext>
             </a:extLst>
           </p:cNvPr>
@@ -12857,14 +12864,14 @@
                 <a:gridCol w="4953000">
                   <a:extLst>
                     <a:ext uri="{9D8B030D-6E8A-4147-A177-3AD203B41FA5}">
-                      <a16:colId xmlns:a16="http://schemas.microsoft.com/office/drawing/2014/main" xmlns="" val="3192133458"/>
+                      <a16:colId xmlns="" xmlns:a16="http://schemas.microsoft.com/office/drawing/2014/main" val="3192133458"/>
                     </a:ext>
                   </a:extLst>
                 </a:gridCol>
                 <a:gridCol w="4953000">
                   <a:extLst>
                     <a:ext uri="{9D8B030D-6E8A-4147-A177-3AD203B41FA5}">
-                      <a16:colId xmlns:a16="http://schemas.microsoft.com/office/drawing/2014/main" xmlns="" val="1019433069"/>
+                      <a16:colId xmlns="" xmlns:a16="http://schemas.microsoft.com/office/drawing/2014/main" val="1019433069"/>
                     </a:ext>
                   </a:extLst>
                 </a:gridCol>
@@ -12898,7 +12905,7 @@
                 </a:tc>
                 <a:extLst>
                   <a:ext uri="{0D108BD9-81ED-4DB2-BD59-A6C34878D82A}">
-                    <a16:rowId xmlns:a16="http://schemas.microsoft.com/office/drawing/2014/main" xmlns="" val="3629679859"/>
+                    <a16:rowId xmlns="" xmlns:a16="http://schemas.microsoft.com/office/drawing/2014/main" val="3629679859"/>
                   </a:ext>
                 </a:extLst>
               </a:tr>
@@ -12932,7 +12939,7 @@
                 </a:tc>
                 <a:extLst>
                   <a:ext uri="{0D108BD9-81ED-4DB2-BD59-A6C34878D82A}">
-                    <a16:rowId xmlns:a16="http://schemas.microsoft.com/office/drawing/2014/main" xmlns="" val="842391858"/>
+                    <a16:rowId xmlns="" xmlns:a16="http://schemas.microsoft.com/office/drawing/2014/main" val="842391858"/>
                   </a:ext>
                 </a:extLst>
               </a:tr>
@@ -12974,7 +12981,7 @@
                 </a:tc>
                 <a:extLst>
                   <a:ext uri="{0D108BD9-81ED-4DB2-BD59-A6C34878D82A}">
-                    <a16:rowId xmlns:a16="http://schemas.microsoft.com/office/drawing/2014/main" xmlns="" val="4226288476"/>
+                    <a16:rowId xmlns="" xmlns:a16="http://schemas.microsoft.com/office/drawing/2014/main" val="4226288476"/>
                   </a:ext>
                 </a:extLst>
               </a:tr>
@@ -13016,7 +13023,7 @@
                 </a:tc>
                 <a:extLst>
                   <a:ext uri="{0D108BD9-81ED-4DB2-BD59-A6C34878D82A}">
-                    <a16:rowId xmlns:a16="http://schemas.microsoft.com/office/drawing/2014/main" xmlns="" val="977914032"/>
+                    <a16:rowId xmlns="" xmlns:a16="http://schemas.microsoft.com/office/drawing/2014/main" val="977914032"/>
                   </a:ext>
                 </a:extLst>
               </a:tr>
@@ -13050,7 +13057,7 @@
                 </a:tc>
                 <a:extLst>
                   <a:ext uri="{0D108BD9-81ED-4DB2-BD59-A6C34878D82A}">
-                    <a16:rowId xmlns:a16="http://schemas.microsoft.com/office/drawing/2014/main" xmlns="" val="3016499460"/>
+                    <a16:rowId xmlns="" xmlns:a16="http://schemas.microsoft.com/office/drawing/2014/main" val="3016499460"/>
                   </a:ext>
                 </a:extLst>
               </a:tr>
@@ -13084,7 +13091,7 @@
                 </a:tc>
                 <a:extLst>
                   <a:ext uri="{0D108BD9-81ED-4DB2-BD59-A6C34878D82A}">
-                    <a16:rowId xmlns:a16="http://schemas.microsoft.com/office/drawing/2014/main" xmlns="" val="3390262191"/>
+                    <a16:rowId xmlns="" xmlns:a16="http://schemas.microsoft.com/office/drawing/2014/main" val="3390262191"/>
                   </a:ext>
                 </a:extLst>
               </a:tr>
@@ -13118,7 +13125,7 @@
                 </a:tc>
                 <a:extLst>
                   <a:ext uri="{0D108BD9-81ED-4DB2-BD59-A6C34878D82A}">
-                    <a16:rowId xmlns:a16="http://schemas.microsoft.com/office/drawing/2014/main" xmlns="" val="514612924"/>
+                    <a16:rowId xmlns="" xmlns:a16="http://schemas.microsoft.com/office/drawing/2014/main" val="514612924"/>
                   </a:ext>
                 </a:extLst>
               </a:tr>
@@ -13152,7 +13159,7 @@
                 </a:tc>
                 <a:extLst>
                   <a:ext uri="{0D108BD9-81ED-4DB2-BD59-A6C34878D82A}">
-                    <a16:rowId xmlns:a16="http://schemas.microsoft.com/office/drawing/2014/main" xmlns="" val="1271004067"/>
+                    <a16:rowId xmlns="" xmlns:a16="http://schemas.microsoft.com/office/drawing/2014/main" val="1271004067"/>
                   </a:ext>
                 </a:extLst>
               </a:tr>
@@ -13186,7 +13193,7 @@
                 </a:tc>
                 <a:extLst>
                   <a:ext uri="{0D108BD9-81ED-4DB2-BD59-A6C34878D82A}">
-                    <a16:rowId xmlns:a16="http://schemas.microsoft.com/office/drawing/2014/main" xmlns="" val="3722481887"/>
+                    <a16:rowId xmlns="" xmlns:a16="http://schemas.microsoft.com/office/drawing/2014/main" val="3722481887"/>
                   </a:ext>
                 </a:extLst>
               </a:tr>
@@ -13199,7 +13206,7 @@
           <p:cNvPr id="5" name="文本框 4">
             <a:extLst>
               <a:ext uri="{FF2B5EF4-FFF2-40B4-BE49-F238E27FC236}">
-                <a16:creationId xmlns:a16="http://schemas.microsoft.com/office/drawing/2014/main" xmlns="" id="{877E5063-EA2D-1A4C-BFCE-539D622CC5FB}"/>
+                <a16:creationId xmlns="" xmlns:a16="http://schemas.microsoft.com/office/drawing/2014/main" id="{877E5063-EA2D-1A4C-BFCE-539D622CC5FB}"/>
               </a:ext>
             </a:extLst>
           </p:cNvPr>
@@ -13320,7 +13327,7 @@
           <p:cNvPr id="6" name="文本框 5">
             <a:extLst>
               <a:ext uri="{FF2B5EF4-FFF2-40B4-BE49-F238E27FC236}">
-                <a16:creationId xmlns:a16="http://schemas.microsoft.com/office/drawing/2014/main" xmlns="" id="{E05B8AF8-5EB4-7145-BBB9-EEBFC0C6A29A}"/>
+                <a16:creationId xmlns="" xmlns:a16="http://schemas.microsoft.com/office/drawing/2014/main" id="{E05B8AF8-5EB4-7145-BBB9-EEBFC0C6A29A}"/>
               </a:ext>
             </a:extLst>
           </p:cNvPr>
@@ -13476,7 +13483,7 @@
           <p:cNvPr id="2" name="标题 1">
             <a:extLst>
               <a:ext uri="{FF2B5EF4-FFF2-40B4-BE49-F238E27FC236}">
-                <a16:creationId xmlns:a16="http://schemas.microsoft.com/office/drawing/2014/main" xmlns="" id="{867F0524-9635-FE44-B479-E3801DE54FED}"/>
+                <a16:creationId xmlns="" xmlns:a16="http://schemas.microsoft.com/office/drawing/2014/main" id="{867F0524-9635-FE44-B479-E3801DE54FED}"/>
               </a:ext>
             </a:extLst>
           </p:cNvPr>
@@ -13517,7 +13524,7 @@
           <p:cNvPr id="3" name="内容占位符 2">
             <a:extLst>
               <a:ext uri="{FF2B5EF4-FFF2-40B4-BE49-F238E27FC236}">
-                <a16:creationId xmlns:a16="http://schemas.microsoft.com/office/drawing/2014/main" xmlns="" id="{7CF8EAFB-8E55-6441-A09B-4DCEC2B88C94}"/>
+                <a16:creationId xmlns="" xmlns:a16="http://schemas.microsoft.com/office/drawing/2014/main" id="{7CF8EAFB-8E55-6441-A09B-4DCEC2B88C94}"/>
               </a:ext>
             </a:extLst>
           </p:cNvPr>
@@ -13571,7 +13578,7 @@
           <p:cNvPr id="4" name="表格 3">
             <a:extLst>
               <a:ext uri="{FF2B5EF4-FFF2-40B4-BE49-F238E27FC236}">
-                <a16:creationId xmlns:a16="http://schemas.microsoft.com/office/drawing/2014/main" xmlns="" id="{831259C1-0F0E-1544-885B-1C80ECC22384}"/>
+                <a16:creationId xmlns="" xmlns:a16="http://schemas.microsoft.com/office/drawing/2014/main" id="{831259C1-0F0E-1544-885B-1C80ECC22384}"/>
               </a:ext>
             </a:extLst>
           </p:cNvPr>
@@ -13600,14 +13607,14 @@
                 <a:gridCol w="4451865">
                   <a:extLst>
                     <a:ext uri="{9D8B030D-6E8A-4147-A177-3AD203B41FA5}">
-                      <a16:colId xmlns:a16="http://schemas.microsoft.com/office/drawing/2014/main" xmlns="" val="3094313645"/>
+                      <a16:colId xmlns="" xmlns:a16="http://schemas.microsoft.com/office/drawing/2014/main" val="3094313645"/>
                     </a:ext>
                   </a:extLst>
                 </a:gridCol>
                 <a:gridCol w="4451865">
                   <a:extLst>
                     <a:ext uri="{9D8B030D-6E8A-4147-A177-3AD203B41FA5}">
-                      <a16:colId xmlns:a16="http://schemas.microsoft.com/office/drawing/2014/main" xmlns="" val="1138522184"/>
+                      <a16:colId xmlns="" xmlns:a16="http://schemas.microsoft.com/office/drawing/2014/main" val="1138522184"/>
                     </a:ext>
                   </a:extLst>
                 </a:gridCol>
@@ -13641,7 +13648,7 @@
                 </a:tc>
                 <a:extLst>
                   <a:ext uri="{0D108BD9-81ED-4DB2-BD59-A6C34878D82A}">
-                    <a16:rowId xmlns:a16="http://schemas.microsoft.com/office/drawing/2014/main" xmlns="" val="310735655"/>
+                    <a16:rowId xmlns="" xmlns:a16="http://schemas.microsoft.com/office/drawing/2014/main" val="310735655"/>
                   </a:ext>
                 </a:extLst>
               </a:tr>
@@ -13676,7 +13683,7 @@
                 </a:tc>
                 <a:extLst>
                   <a:ext uri="{0D108BD9-81ED-4DB2-BD59-A6C34878D82A}">
-                    <a16:rowId xmlns:a16="http://schemas.microsoft.com/office/drawing/2014/main" xmlns="" val="3786297470"/>
+                    <a16:rowId xmlns="" xmlns:a16="http://schemas.microsoft.com/office/drawing/2014/main" val="3786297470"/>
                   </a:ext>
                 </a:extLst>
               </a:tr>
@@ -13710,7 +13717,7 @@
                 </a:tc>
                 <a:extLst>
                   <a:ext uri="{0D108BD9-81ED-4DB2-BD59-A6C34878D82A}">
-                    <a16:rowId xmlns:a16="http://schemas.microsoft.com/office/drawing/2014/main" xmlns="" val="3356899382"/>
+                    <a16:rowId xmlns="" xmlns:a16="http://schemas.microsoft.com/office/drawing/2014/main" val="3356899382"/>
                   </a:ext>
                 </a:extLst>
               </a:tr>
@@ -13753,7 +13760,7 @@
                 </a:tc>
                 <a:extLst>
                   <a:ext uri="{0D108BD9-81ED-4DB2-BD59-A6C34878D82A}">
-                    <a16:rowId xmlns:a16="http://schemas.microsoft.com/office/drawing/2014/main" xmlns="" val="1719600412"/>
+                    <a16:rowId xmlns="" xmlns:a16="http://schemas.microsoft.com/office/drawing/2014/main" val="1719600412"/>
                   </a:ext>
                 </a:extLst>
               </a:tr>
@@ -13796,7 +13803,7 @@
                 </a:tc>
                 <a:extLst>
                   <a:ext uri="{0D108BD9-81ED-4DB2-BD59-A6C34878D82A}">
-                    <a16:rowId xmlns:a16="http://schemas.microsoft.com/office/drawing/2014/main" xmlns="" val="2656817569"/>
+                    <a16:rowId xmlns="" xmlns:a16="http://schemas.microsoft.com/office/drawing/2014/main" val="2656817569"/>
                   </a:ext>
                 </a:extLst>
               </a:tr>
@@ -13809,7 +13816,7 @@
           <p:cNvPr id="5" name="文本框 4">
             <a:extLst>
               <a:ext uri="{FF2B5EF4-FFF2-40B4-BE49-F238E27FC236}">
-                <a16:creationId xmlns:a16="http://schemas.microsoft.com/office/drawing/2014/main" xmlns="" id="{8C341C65-44B0-9E4B-B82E-E4F08C91B00B}"/>
+                <a16:creationId xmlns="" xmlns:a16="http://schemas.microsoft.com/office/drawing/2014/main" id="{8C341C65-44B0-9E4B-B82E-E4F08C91B00B}"/>
               </a:ext>
             </a:extLst>
           </p:cNvPr>
@@ -13879,7 +13886,7 @@
           <p:cNvPr id="2" name="标题 1">
             <a:extLst>
               <a:ext uri="{FF2B5EF4-FFF2-40B4-BE49-F238E27FC236}">
-                <a16:creationId xmlns:a16="http://schemas.microsoft.com/office/drawing/2014/main" xmlns="" id="{C402B4BF-C80B-5545-9B83-28C2A51F4AD7}"/>
+                <a16:creationId xmlns="" xmlns:a16="http://schemas.microsoft.com/office/drawing/2014/main" id="{C402B4BF-C80B-5545-9B83-28C2A51F4AD7}"/>
               </a:ext>
             </a:extLst>
           </p:cNvPr>
@@ -13924,7 +13931,7 @@
           <p:cNvPr id="3" name="内容占位符 2">
             <a:extLst>
               <a:ext uri="{FF2B5EF4-FFF2-40B4-BE49-F238E27FC236}">
-                <a16:creationId xmlns:a16="http://schemas.microsoft.com/office/drawing/2014/main" xmlns="" id="{3465E6DF-76AD-7B40-85A8-B070D01E7CB1}"/>
+                <a16:creationId xmlns="" xmlns:a16="http://schemas.microsoft.com/office/drawing/2014/main" id="{3465E6DF-76AD-7B40-85A8-B070D01E7CB1}"/>
               </a:ext>
             </a:extLst>
           </p:cNvPr>
@@ -13980,7 +13987,7 @@
           <p:cNvPr id="4" name="表格 3">
             <a:extLst>
               <a:ext uri="{FF2B5EF4-FFF2-40B4-BE49-F238E27FC236}">
-                <a16:creationId xmlns:a16="http://schemas.microsoft.com/office/drawing/2014/main" xmlns="" id="{AC33EEA0-1411-744B-8462-19A063A84555}"/>
+                <a16:creationId xmlns="" xmlns:a16="http://schemas.microsoft.com/office/drawing/2014/main" id="{AC33EEA0-1411-744B-8462-19A063A84555}"/>
               </a:ext>
             </a:extLst>
           </p:cNvPr>
@@ -14009,14 +14016,14 @@
                 <a:gridCol w="4064000">
                   <a:extLst>
                     <a:ext uri="{9D8B030D-6E8A-4147-A177-3AD203B41FA5}">
-                      <a16:colId xmlns:a16="http://schemas.microsoft.com/office/drawing/2014/main" xmlns="" val="1169781933"/>
+                      <a16:colId xmlns="" xmlns:a16="http://schemas.microsoft.com/office/drawing/2014/main" val="1169781933"/>
                     </a:ext>
                   </a:extLst>
                 </a:gridCol>
                 <a:gridCol w="4064000">
                   <a:extLst>
                     <a:ext uri="{9D8B030D-6E8A-4147-A177-3AD203B41FA5}">
-                      <a16:colId xmlns:a16="http://schemas.microsoft.com/office/drawing/2014/main" xmlns="" val="2507217993"/>
+                      <a16:colId xmlns="" xmlns:a16="http://schemas.microsoft.com/office/drawing/2014/main" val="2507217993"/>
                     </a:ext>
                   </a:extLst>
                 </a:gridCol>
@@ -14050,7 +14057,7 @@
                 </a:tc>
                 <a:extLst>
                   <a:ext uri="{0D108BD9-81ED-4DB2-BD59-A6C34878D82A}">
-                    <a16:rowId xmlns:a16="http://schemas.microsoft.com/office/drawing/2014/main" xmlns="" val="3476065848"/>
+                    <a16:rowId xmlns="" xmlns:a16="http://schemas.microsoft.com/office/drawing/2014/main" val="3476065848"/>
                   </a:ext>
                 </a:extLst>
               </a:tr>
@@ -14092,7 +14099,7 @@
                 </a:tc>
                 <a:extLst>
                   <a:ext uri="{0D108BD9-81ED-4DB2-BD59-A6C34878D82A}">
-                    <a16:rowId xmlns:a16="http://schemas.microsoft.com/office/drawing/2014/main" xmlns="" val="4277468793"/>
+                    <a16:rowId xmlns="" xmlns:a16="http://schemas.microsoft.com/office/drawing/2014/main" val="4277468793"/>
                   </a:ext>
                 </a:extLst>
               </a:tr>
@@ -14126,7 +14133,7 @@
                 </a:tc>
                 <a:extLst>
                   <a:ext uri="{0D108BD9-81ED-4DB2-BD59-A6C34878D82A}">
-                    <a16:rowId xmlns:a16="http://schemas.microsoft.com/office/drawing/2014/main" xmlns="" val="3596418856"/>
+                    <a16:rowId xmlns="" xmlns:a16="http://schemas.microsoft.com/office/drawing/2014/main" val="3596418856"/>
                   </a:ext>
                 </a:extLst>
               </a:tr>
@@ -14168,7 +14175,7 @@
                 </a:tc>
                 <a:extLst>
                   <a:ext uri="{0D108BD9-81ED-4DB2-BD59-A6C34878D82A}">
-                    <a16:rowId xmlns:a16="http://schemas.microsoft.com/office/drawing/2014/main" xmlns="" val="3445826486"/>
+                    <a16:rowId xmlns="" xmlns:a16="http://schemas.microsoft.com/office/drawing/2014/main" val="3445826486"/>
                   </a:ext>
                 </a:extLst>
               </a:tr>
@@ -14202,7 +14209,7 @@
                 </a:tc>
                 <a:extLst>
                   <a:ext uri="{0D108BD9-81ED-4DB2-BD59-A6C34878D82A}">
-                    <a16:rowId xmlns:a16="http://schemas.microsoft.com/office/drawing/2014/main" xmlns="" val="1573232477"/>
+                    <a16:rowId xmlns="" xmlns:a16="http://schemas.microsoft.com/office/drawing/2014/main" val="1573232477"/>
                   </a:ext>
                 </a:extLst>
               </a:tr>
@@ -14215,7 +14222,7 @@
           <p:cNvPr id="5" name="文本框 4">
             <a:extLst>
               <a:ext uri="{FF2B5EF4-FFF2-40B4-BE49-F238E27FC236}">
-                <a16:creationId xmlns:a16="http://schemas.microsoft.com/office/drawing/2014/main" xmlns="" id="{28285AF0-C6FE-E143-975F-084EB5239261}"/>
+                <a16:creationId xmlns="" xmlns:a16="http://schemas.microsoft.com/office/drawing/2014/main" id="{28285AF0-C6FE-E143-975F-084EB5239261}"/>
               </a:ext>
             </a:extLst>
           </p:cNvPr>
@@ -14285,7 +14292,7 @@
           <p:cNvPr id="2" name="标题 1">
             <a:extLst>
               <a:ext uri="{FF2B5EF4-FFF2-40B4-BE49-F238E27FC236}">
-                <a16:creationId xmlns:a16="http://schemas.microsoft.com/office/drawing/2014/main" xmlns="" id="{33EBD955-529A-D740-8F78-8AA3223338A9}"/>
+                <a16:creationId xmlns="" xmlns:a16="http://schemas.microsoft.com/office/drawing/2014/main" id="{33EBD955-529A-D740-8F78-8AA3223338A9}"/>
               </a:ext>
             </a:extLst>
           </p:cNvPr>
@@ -14342,7 +14349,7 @@
           <p:cNvPr id="3" name="内容占位符 2">
             <a:extLst>
               <a:ext uri="{FF2B5EF4-FFF2-40B4-BE49-F238E27FC236}">
-                <a16:creationId xmlns:a16="http://schemas.microsoft.com/office/drawing/2014/main" xmlns="" id="{C1A8F510-A5BF-934B-9FCB-A21D917DF739}"/>
+                <a16:creationId xmlns="" xmlns:a16="http://schemas.microsoft.com/office/drawing/2014/main" id="{C1A8F510-A5BF-934B-9FCB-A21D917DF739}"/>
               </a:ext>
             </a:extLst>
           </p:cNvPr>
@@ -14421,7 +14428,7 @@
           <p:cNvPr id="4" name="表格 3">
             <a:extLst>
               <a:ext uri="{FF2B5EF4-FFF2-40B4-BE49-F238E27FC236}">
-                <a16:creationId xmlns:a16="http://schemas.microsoft.com/office/drawing/2014/main" xmlns="" id="{405A8B1B-48DA-7C44-B866-82755C2FAFB3}"/>
+                <a16:creationId xmlns="" xmlns:a16="http://schemas.microsoft.com/office/drawing/2014/main" id="{405A8B1B-48DA-7C44-B866-82755C2FAFB3}"/>
               </a:ext>
             </a:extLst>
           </p:cNvPr>
@@ -14450,14 +14457,14 @@
                 <a:gridCol w="4064000">
                   <a:extLst>
                     <a:ext uri="{9D8B030D-6E8A-4147-A177-3AD203B41FA5}">
-                      <a16:colId xmlns:a16="http://schemas.microsoft.com/office/drawing/2014/main" xmlns="" val="229943434"/>
+                      <a16:colId xmlns="" xmlns:a16="http://schemas.microsoft.com/office/drawing/2014/main" val="229943434"/>
                     </a:ext>
                   </a:extLst>
                 </a:gridCol>
                 <a:gridCol w="4064000">
                   <a:extLst>
                     <a:ext uri="{9D8B030D-6E8A-4147-A177-3AD203B41FA5}">
-                      <a16:colId xmlns:a16="http://schemas.microsoft.com/office/drawing/2014/main" xmlns="" val="2278695864"/>
+                      <a16:colId xmlns="" xmlns:a16="http://schemas.microsoft.com/office/drawing/2014/main" val="2278695864"/>
                     </a:ext>
                   </a:extLst>
                 </a:gridCol>
@@ -14491,7 +14498,7 @@
                 </a:tc>
                 <a:extLst>
                   <a:ext uri="{0D108BD9-81ED-4DB2-BD59-A6C34878D82A}">
-                    <a16:rowId xmlns:a16="http://schemas.microsoft.com/office/drawing/2014/main" xmlns="" val="1535897880"/>
+                    <a16:rowId xmlns="" xmlns:a16="http://schemas.microsoft.com/office/drawing/2014/main" val="1535897880"/>
                   </a:ext>
                 </a:extLst>
               </a:tr>
@@ -14525,7 +14532,7 @@
                 </a:tc>
                 <a:extLst>
                   <a:ext uri="{0D108BD9-81ED-4DB2-BD59-A6C34878D82A}">
-                    <a16:rowId xmlns:a16="http://schemas.microsoft.com/office/drawing/2014/main" xmlns="" val="893051134"/>
+                    <a16:rowId xmlns="" xmlns:a16="http://schemas.microsoft.com/office/drawing/2014/main" val="893051134"/>
                   </a:ext>
                 </a:extLst>
               </a:tr>
@@ -14563,7 +14570,7 @@
                 </a:tc>
                 <a:extLst>
                   <a:ext uri="{0D108BD9-81ED-4DB2-BD59-A6C34878D82A}">
-                    <a16:rowId xmlns:a16="http://schemas.microsoft.com/office/drawing/2014/main" xmlns="" val="1557464402"/>
+                    <a16:rowId xmlns="" xmlns:a16="http://schemas.microsoft.com/office/drawing/2014/main" val="1557464402"/>
                   </a:ext>
                 </a:extLst>
               </a:tr>
@@ -14635,7 +14642,7 @@
                 </a:tc>
                 <a:extLst>
                   <a:ext uri="{0D108BD9-81ED-4DB2-BD59-A6C34878D82A}">
-                    <a16:rowId xmlns:a16="http://schemas.microsoft.com/office/drawing/2014/main" xmlns="" val="180159287"/>
+                    <a16:rowId xmlns="" xmlns:a16="http://schemas.microsoft.com/office/drawing/2014/main" val="180159287"/>
                   </a:ext>
                 </a:extLst>
               </a:tr>
@@ -14648,7 +14655,7 @@
           <p:cNvPr id="6" name="文本框 5">
             <a:extLst>
               <a:ext uri="{FF2B5EF4-FFF2-40B4-BE49-F238E27FC236}">
-                <a16:creationId xmlns:a16="http://schemas.microsoft.com/office/drawing/2014/main" xmlns="" id="{616991BE-E625-2145-A8E3-868292B2F841}"/>
+                <a16:creationId xmlns="" xmlns:a16="http://schemas.microsoft.com/office/drawing/2014/main" id="{616991BE-E625-2145-A8E3-868292B2F841}"/>
               </a:ext>
             </a:extLst>
           </p:cNvPr>
@@ -14718,7 +14725,7 @@
           <p:cNvPr id="2" name="标题 1">
             <a:extLst>
               <a:ext uri="{FF2B5EF4-FFF2-40B4-BE49-F238E27FC236}">
-                <a16:creationId xmlns:a16="http://schemas.microsoft.com/office/drawing/2014/main" xmlns="" id="{98B90086-8EB8-A142-8204-57041D11117F}"/>
+                <a16:creationId xmlns="" xmlns:a16="http://schemas.microsoft.com/office/drawing/2014/main" id="{98B90086-8EB8-A142-8204-57041D11117F}"/>
               </a:ext>
             </a:extLst>
           </p:cNvPr>
@@ -14775,7 +14782,7 @@
           <p:cNvPr id="3" name="内容占位符 2">
             <a:extLst>
               <a:ext uri="{FF2B5EF4-FFF2-40B4-BE49-F238E27FC236}">
-                <a16:creationId xmlns:a16="http://schemas.microsoft.com/office/drawing/2014/main" xmlns="" id="{BBE69D68-4436-294A-B22B-1856C6EF06CF}"/>
+                <a16:creationId xmlns="" xmlns:a16="http://schemas.microsoft.com/office/drawing/2014/main" id="{BBE69D68-4436-294A-B22B-1856C6EF06CF}"/>
               </a:ext>
             </a:extLst>
           </p:cNvPr>
@@ -15678,7 +15685,7 @@
           <p:cNvPr id="2" name="标题 1">
             <a:extLst>
               <a:ext uri="{FF2B5EF4-FFF2-40B4-BE49-F238E27FC236}">
-                <a16:creationId xmlns:a16="http://schemas.microsoft.com/office/drawing/2014/main" xmlns="" id="{C822B65F-0EDD-4A46-A5C3-7B63B013C943}"/>
+                <a16:creationId xmlns="" xmlns:a16="http://schemas.microsoft.com/office/drawing/2014/main" id="{C822B65F-0EDD-4A46-A5C3-7B63B013C943}"/>
               </a:ext>
             </a:extLst>
           </p:cNvPr>
@@ -15702,7 +15709,6 @@
               <a:rPr kumimoji="1" lang="zh-CN" altLang="en-US" dirty="0"/>
               <a:t>零基础入门</a:t>
             </a:r>
-            <a:endParaRPr kumimoji="1" lang="zh-CN" altLang="en-US" dirty="0"/>
           </a:p>
         </p:txBody>
       </p:sp>
@@ -15711,7 +15717,7 @@
           <p:cNvPr id="3" name="内容占位符 2">
             <a:extLst>
               <a:ext uri="{FF2B5EF4-FFF2-40B4-BE49-F238E27FC236}">
-                <a16:creationId xmlns:a16="http://schemas.microsoft.com/office/drawing/2014/main" xmlns="" id="{8784E2CF-C033-024D-820F-377B30D98B75}"/>
+                <a16:creationId xmlns="" xmlns:a16="http://schemas.microsoft.com/office/drawing/2014/main" id="{8784E2CF-C033-024D-820F-377B30D98B75}"/>
               </a:ext>
             </a:extLst>
           </p:cNvPr>
@@ -15769,6 +15775,13 @@
   <p:clrMapOvr>
     <a:masterClrMapping/>
   </p:clrMapOvr>
+  <p:timing>
+    <p:tnLst>
+      <p:par>
+        <p:cTn id="1" dur="indefinite" restart="never" nodeType="tmRoot"/>
+      </p:par>
+    </p:tnLst>
+  </p:timing>
 </p:sld>
 </file>
 
@@ -16043,7 +16056,7 @@
           <p:cNvPr id="2" name="标题 1">
             <a:extLst>
               <a:ext uri="{FF2B5EF4-FFF2-40B4-BE49-F238E27FC236}">
-                <a16:creationId xmlns:a16="http://schemas.microsoft.com/office/drawing/2014/main" xmlns="" id="{2FDE1641-3F4D-9542-8648-E563989A7DD5}"/>
+                <a16:creationId xmlns="" xmlns:a16="http://schemas.microsoft.com/office/drawing/2014/main" id="{2FDE1641-3F4D-9542-8648-E563989A7DD5}"/>
               </a:ext>
             </a:extLst>
           </p:cNvPr>
@@ -16071,7 +16084,7 @@
           <p:cNvPr id="3" name="内容占位符 2">
             <a:extLst>
               <a:ext uri="{FF2B5EF4-FFF2-40B4-BE49-F238E27FC236}">
-                <a16:creationId xmlns:a16="http://schemas.microsoft.com/office/drawing/2014/main" xmlns="" id="{DCC7BDF8-4E9A-9541-9CBB-F94E23C21D5B}"/>
+                <a16:creationId xmlns="" xmlns:a16="http://schemas.microsoft.com/office/drawing/2014/main" id="{DCC7BDF8-4E9A-9541-9CBB-F94E23C21D5B}"/>
               </a:ext>
             </a:extLst>
           </p:cNvPr>
@@ -16089,7 +16102,25 @@
           <a:p>
             <a:r>
               <a:rPr kumimoji="1" lang="zh-CN" altLang="en-US" dirty="0"/>
-              <a:t>注释及页面调试</a:t>
+              <a:t>注释及页面</a:t>
+            </a:r>
+            <a:r>
+              <a:rPr kumimoji="1" lang="zh-CN" altLang="en-US" dirty="0" smtClean="0"/>
+              <a:t>调试</a:t>
+            </a:r>
+            <a:r>
+              <a:rPr kumimoji="1" lang="en-US" altLang="zh-CN" dirty="0" smtClean="0"/>
+              <a:t>&lt;!--  </a:t>
+            </a:r>
+            <a:r>
+              <a:rPr kumimoji="1" lang="en-US" altLang="zh-CN" dirty="0" err="1" smtClean="0"/>
+              <a:t>xxxxxxxx</a:t>
+            </a:r>
+            <a:r>
+              <a:rPr kumimoji="1" lang="en-US" altLang="zh-CN" dirty="0" smtClean="0">
+                <a:sym typeface="Wingdings" pitchFamily="2" charset="2"/>
+              </a:rPr>
+              <a:t>--&gt;  </a:t>
             </a:r>
             <a:endParaRPr kumimoji="1" lang="en-US" altLang="zh-CN" dirty="0"/>
           </a:p>
@@ -16158,7 +16189,7 @@
           <p:cNvPr id="2" name="标题 1">
             <a:extLst>
               <a:ext uri="{FF2B5EF4-FFF2-40B4-BE49-F238E27FC236}">
-                <a16:creationId xmlns:a16="http://schemas.microsoft.com/office/drawing/2014/main" xmlns="" id="{9287700E-5588-4E4C-B0D8-8659D22586A1}"/>
+                <a16:creationId xmlns="" xmlns:a16="http://schemas.microsoft.com/office/drawing/2014/main" id="{9287700E-5588-4E4C-B0D8-8659D22586A1}"/>
               </a:ext>
             </a:extLst>
           </p:cNvPr>
@@ -16186,7 +16217,7 @@
           <p:cNvPr id="4" name="内容占位符 3">
             <a:extLst>
               <a:ext uri="{FF2B5EF4-FFF2-40B4-BE49-F238E27FC236}">
-                <a16:creationId xmlns:a16="http://schemas.microsoft.com/office/drawing/2014/main" xmlns="" id="{CD9338E7-D765-0349-9352-2048ED92A82A}"/>
+                <a16:creationId xmlns="" xmlns:a16="http://schemas.microsoft.com/office/drawing/2014/main" id="{CD9338E7-D765-0349-9352-2048ED92A82A}"/>
               </a:ext>
             </a:extLst>
           </p:cNvPr>
@@ -16216,21 +16247,21 @@
                 <a:gridCol w="3302000">
                   <a:extLst>
                     <a:ext uri="{9D8B030D-6E8A-4147-A177-3AD203B41FA5}">
-                      <a16:colId xmlns:a16="http://schemas.microsoft.com/office/drawing/2014/main" xmlns="" val="3210599519"/>
+                      <a16:colId xmlns="" xmlns:a16="http://schemas.microsoft.com/office/drawing/2014/main" val="3210599519"/>
                     </a:ext>
                   </a:extLst>
                 </a:gridCol>
                 <a:gridCol w="3302000">
                   <a:extLst>
                     <a:ext uri="{9D8B030D-6E8A-4147-A177-3AD203B41FA5}">
-                      <a16:colId xmlns:a16="http://schemas.microsoft.com/office/drawing/2014/main" xmlns="" val="2865035805"/>
+                      <a16:colId xmlns="" xmlns:a16="http://schemas.microsoft.com/office/drawing/2014/main" val="2865035805"/>
                     </a:ext>
                   </a:extLst>
                 </a:gridCol>
                 <a:gridCol w="3302000">
                   <a:extLst>
                     <a:ext uri="{9D8B030D-6E8A-4147-A177-3AD203B41FA5}">
-                      <a16:colId xmlns:a16="http://schemas.microsoft.com/office/drawing/2014/main" xmlns="" val="381221722"/>
+                      <a16:colId xmlns="" xmlns:a16="http://schemas.microsoft.com/office/drawing/2014/main" val="381221722"/>
                     </a:ext>
                   </a:extLst>
                 </a:gridCol>
@@ -16285,7 +16316,7 @@
                 </a:tc>
                 <a:extLst>
                   <a:ext uri="{0D108BD9-81ED-4DB2-BD59-A6C34878D82A}">
-                    <a16:rowId xmlns:a16="http://schemas.microsoft.com/office/drawing/2014/main" xmlns="" val="8188460"/>
+                    <a16:rowId xmlns="" xmlns:a16="http://schemas.microsoft.com/office/drawing/2014/main" val="8188460"/>
                   </a:ext>
                 </a:extLst>
               </a:tr>
@@ -16332,7 +16363,7 @@
                 </a:tc>
                 <a:extLst>
                   <a:ext uri="{0D108BD9-81ED-4DB2-BD59-A6C34878D82A}">
-                    <a16:rowId xmlns:a16="http://schemas.microsoft.com/office/drawing/2014/main" xmlns="" val="2413540259"/>
+                    <a16:rowId xmlns="" xmlns:a16="http://schemas.microsoft.com/office/drawing/2014/main" val="2413540259"/>
                   </a:ext>
                 </a:extLst>
               </a:tr>
@@ -16379,7 +16410,7 @@
                 </a:tc>
                 <a:extLst>
                   <a:ext uri="{0D108BD9-81ED-4DB2-BD59-A6C34878D82A}">
-                    <a16:rowId xmlns:a16="http://schemas.microsoft.com/office/drawing/2014/main" xmlns="" val="3958371854"/>
+                    <a16:rowId xmlns="" xmlns:a16="http://schemas.microsoft.com/office/drawing/2014/main" val="3958371854"/>
                   </a:ext>
                 </a:extLst>
               </a:tr>
@@ -16426,7 +16457,7 @@
                 </a:tc>
                 <a:extLst>
                   <a:ext uri="{0D108BD9-81ED-4DB2-BD59-A6C34878D82A}">
-                    <a16:rowId xmlns:a16="http://schemas.microsoft.com/office/drawing/2014/main" xmlns="" val="448027485"/>
+                    <a16:rowId xmlns="" xmlns:a16="http://schemas.microsoft.com/office/drawing/2014/main" val="448027485"/>
                   </a:ext>
                 </a:extLst>
               </a:tr>
@@ -16482,7 +16513,7 @@
                 </a:tc>
                 <a:extLst>
                   <a:ext uri="{0D108BD9-81ED-4DB2-BD59-A6C34878D82A}">
-                    <a16:rowId xmlns:a16="http://schemas.microsoft.com/office/drawing/2014/main" xmlns="" val="2595851560"/>
+                    <a16:rowId xmlns="" xmlns:a16="http://schemas.microsoft.com/office/drawing/2014/main" val="2595851560"/>
                   </a:ext>
                 </a:extLst>
               </a:tr>
@@ -16825,7 +16856,7 @@
           <p:cNvPr id="2" name="标题 1">
             <a:extLst>
               <a:ext uri="{FF2B5EF4-FFF2-40B4-BE49-F238E27FC236}">
-                <a16:creationId xmlns:a16="http://schemas.microsoft.com/office/drawing/2014/main" xmlns="" id="{860F0144-23F6-7C4D-9F28-29257DE1BA4A}"/>
+                <a16:creationId xmlns="" xmlns:a16="http://schemas.microsoft.com/office/drawing/2014/main" id="{860F0144-23F6-7C4D-9F28-29257DE1BA4A}"/>
               </a:ext>
             </a:extLst>
           </p:cNvPr>
@@ -16853,7 +16884,7 @@
           <p:cNvPr id="7" name="内容占位符 6">
             <a:extLst>
               <a:ext uri="{FF2B5EF4-FFF2-40B4-BE49-F238E27FC236}">
-                <a16:creationId xmlns:a16="http://schemas.microsoft.com/office/drawing/2014/main" xmlns="" id="{A7971AE6-9413-134B-B206-E926D8EB20A7}"/>
+                <a16:creationId xmlns="" xmlns:a16="http://schemas.microsoft.com/office/drawing/2014/main" id="{A7971AE6-9413-134B-B206-E926D8EB20A7}"/>
               </a:ext>
             </a:extLst>
           </p:cNvPr>
@@ -16883,14 +16914,14 @@
                 <a:gridCol w="4953000">
                   <a:extLst>
                     <a:ext uri="{9D8B030D-6E8A-4147-A177-3AD203B41FA5}">
-                      <a16:colId xmlns:a16="http://schemas.microsoft.com/office/drawing/2014/main" xmlns="" val="609882192"/>
+                      <a16:colId xmlns="" xmlns:a16="http://schemas.microsoft.com/office/drawing/2014/main" val="609882192"/>
                     </a:ext>
                   </a:extLst>
                 </a:gridCol>
                 <a:gridCol w="4953000">
                   <a:extLst>
                     <a:ext uri="{9D8B030D-6E8A-4147-A177-3AD203B41FA5}">
-                      <a16:colId xmlns:a16="http://schemas.microsoft.com/office/drawing/2014/main" xmlns="" val="2065136613"/>
+                      <a16:colId xmlns="" xmlns:a16="http://schemas.microsoft.com/office/drawing/2014/main" val="2065136613"/>
                     </a:ext>
                   </a:extLst>
                 </a:gridCol>
@@ -16924,7 +16955,7 @@
                 </a:tc>
                 <a:extLst>
                   <a:ext uri="{0D108BD9-81ED-4DB2-BD59-A6C34878D82A}">
-                    <a16:rowId xmlns:a16="http://schemas.microsoft.com/office/drawing/2014/main" xmlns="" val="509098139"/>
+                    <a16:rowId xmlns="" xmlns:a16="http://schemas.microsoft.com/office/drawing/2014/main" val="509098139"/>
                   </a:ext>
                 </a:extLst>
               </a:tr>
@@ -16966,7 +16997,7 @@
                 </a:tc>
                 <a:extLst>
                   <a:ext uri="{0D108BD9-81ED-4DB2-BD59-A6C34878D82A}">
-                    <a16:rowId xmlns:a16="http://schemas.microsoft.com/office/drawing/2014/main" xmlns="" val="3531057521"/>
+                    <a16:rowId xmlns="" xmlns:a16="http://schemas.microsoft.com/office/drawing/2014/main" val="3531057521"/>
                   </a:ext>
                 </a:extLst>
               </a:tr>
@@ -17005,7 +17036,7 @@
                 </a:tc>
                 <a:extLst>
                   <a:ext uri="{0D108BD9-81ED-4DB2-BD59-A6C34878D82A}">
-                    <a16:rowId xmlns:a16="http://schemas.microsoft.com/office/drawing/2014/main" xmlns="" val="1810022148"/>
+                    <a16:rowId xmlns="" xmlns:a16="http://schemas.microsoft.com/office/drawing/2014/main" val="1810022148"/>
                   </a:ext>
                 </a:extLst>
               </a:tr>
@@ -17039,7 +17070,7 @@
                 </a:tc>
                 <a:extLst>
                   <a:ext uri="{0D108BD9-81ED-4DB2-BD59-A6C34878D82A}">
-                    <a16:rowId xmlns:a16="http://schemas.microsoft.com/office/drawing/2014/main" xmlns="" val="2999247194"/>
+                    <a16:rowId xmlns="" xmlns:a16="http://schemas.microsoft.com/office/drawing/2014/main" val="2999247194"/>
                   </a:ext>
                 </a:extLst>
               </a:tr>
@@ -17142,7 +17173,7 @@
           <p:cNvPr id="2" name="标题 1">
             <a:extLst>
               <a:ext uri="{FF2B5EF4-FFF2-40B4-BE49-F238E27FC236}">
-                <a16:creationId xmlns:a16="http://schemas.microsoft.com/office/drawing/2014/main" xmlns="" id="{C822B65F-0EDD-4A46-A5C3-7B63B013C943}"/>
+                <a16:creationId xmlns="" xmlns:a16="http://schemas.microsoft.com/office/drawing/2014/main" id="{C822B65F-0EDD-4A46-A5C3-7B63B013C943}"/>
               </a:ext>
             </a:extLst>
           </p:cNvPr>
@@ -17166,7 +17197,6 @@
               <a:rPr kumimoji="1" lang="zh-CN" altLang="en-US" dirty="0"/>
               <a:t>零基础入门</a:t>
             </a:r>
-            <a:endParaRPr kumimoji="1" lang="zh-CN" altLang="en-US" dirty="0"/>
           </a:p>
         </p:txBody>
       </p:sp>
@@ -17175,7 +17205,7 @@
           <p:cNvPr id="3" name="内容占位符 2">
             <a:extLst>
               <a:ext uri="{FF2B5EF4-FFF2-40B4-BE49-F238E27FC236}">
-                <a16:creationId xmlns:a16="http://schemas.microsoft.com/office/drawing/2014/main" xmlns="" id="{8784E2CF-C033-024D-820F-377B30D98B75}"/>
+                <a16:creationId xmlns="" xmlns:a16="http://schemas.microsoft.com/office/drawing/2014/main" id="{8784E2CF-C033-024D-820F-377B30D98B75}"/>
               </a:ext>
             </a:extLst>
           </p:cNvPr>
@@ -17467,7 +17497,7 @@
           <p:cNvPr id="2" name="标题 1">
             <a:extLst>
               <a:ext uri="{FF2B5EF4-FFF2-40B4-BE49-F238E27FC236}">
-                <a16:creationId xmlns:a16="http://schemas.microsoft.com/office/drawing/2014/main" xmlns="" id="{A1DA5F24-79E0-BF46-A4EE-C5D6930463BB}"/>
+                <a16:creationId xmlns="" xmlns:a16="http://schemas.microsoft.com/office/drawing/2014/main" id="{A1DA5F24-79E0-BF46-A4EE-C5D6930463BB}"/>
               </a:ext>
             </a:extLst>
           </p:cNvPr>
@@ -17500,7 +17530,7 @@
           <p:cNvPr id="3" name="内容占位符 2">
             <a:extLst>
               <a:ext uri="{FF2B5EF4-FFF2-40B4-BE49-F238E27FC236}">
-                <a16:creationId xmlns:a16="http://schemas.microsoft.com/office/drawing/2014/main" xmlns="" id="{78DF1D00-5D60-E447-A55E-E71609B52A1E}"/>
+                <a16:creationId xmlns="" xmlns:a16="http://schemas.microsoft.com/office/drawing/2014/main" id="{78DF1D00-5D60-E447-A55E-E71609B52A1E}"/>
               </a:ext>
             </a:extLst>
           </p:cNvPr>
@@ -17626,6 +17656,13 @@
   <p:clrMapOvr>
     <a:masterClrMapping/>
   </p:clrMapOvr>
+  <p:timing>
+    <p:tnLst>
+      <p:par>
+        <p:cTn id="1" dur="indefinite" restart="never" nodeType="tmRoot"/>
+      </p:par>
+    </p:tnLst>
+  </p:timing>
 </p:sld>
 </file>
 
@@ -17651,7 +17688,7 @@
           <p:cNvPr id="2" name="标题 1">
             <a:extLst>
               <a:ext uri="{FF2B5EF4-FFF2-40B4-BE49-F238E27FC236}">
-                <a16:creationId xmlns:a16="http://schemas.microsoft.com/office/drawing/2014/main" xmlns="" id="{5D6AB750-E8BE-7245-8EC7-573A46F92FBA}"/>
+                <a16:creationId xmlns="" xmlns:a16="http://schemas.microsoft.com/office/drawing/2014/main" id="{5D6AB750-E8BE-7245-8EC7-573A46F92FBA}"/>
               </a:ext>
             </a:extLst>
           </p:cNvPr>
@@ -17683,7 +17720,7 @@
           <p:cNvPr id="3" name="内容占位符 2">
             <a:extLst>
               <a:ext uri="{FF2B5EF4-FFF2-40B4-BE49-F238E27FC236}">
-                <a16:creationId xmlns:a16="http://schemas.microsoft.com/office/drawing/2014/main" xmlns="" id="{66ED4FA1-7895-E846-B181-521EE34D1DE7}"/>
+                <a16:creationId xmlns="" xmlns:a16="http://schemas.microsoft.com/office/drawing/2014/main" id="{66ED4FA1-7895-E846-B181-521EE34D1DE7}"/>
               </a:ext>
             </a:extLst>
           </p:cNvPr>
@@ -17694,10 +17731,15 @@
             <p:ph idx="1"/>
           </p:nvPr>
         </p:nvSpPr>
-        <p:spPr/>
+        <p:spPr>
+          <a:xfrm>
+            <a:off x="1141412" y="1640114"/>
+            <a:ext cx="9905999" cy="4963886"/>
+          </a:xfrm>
+        </p:spPr>
         <p:txBody>
           <a:bodyPr>
-            <a:normAutofit fontScale="70000" lnSpcReduction="20000"/>
+            <a:normAutofit fontScale="92500" lnSpcReduction="10000"/>
           </a:bodyPr>
           <a:lstStyle/>
           <a:p>
@@ -17730,7 +17772,15 @@
             </a:r>
             <a:r>
               <a:rPr kumimoji="1" lang="en-US" altLang="zh-CN" dirty="0"/>
-              <a:t>&lt;b&gt;&lt;/b&gt;</a:t>
+              <a:t>&lt;b</a:t>
+            </a:r>
+            <a:r>
+              <a:rPr kumimoji="1" lang="en-US" altLang="zh-CN" dirty="0" smtClean="0"/>
+              <a:t>&gt;……&lt;/</a:t>
+            </a:r>
+            <a:r>
+              <a:rPr kumimoji="1" lang="en-US" altLang="zh-CN" dirty="0"/>
+              <a:t>b&gt;</a:t>
             </a:r>
           </a:p>
           <a:p>
@@ -17770,6 +17820,10 @@
             <a:r>
               <a:rPr kumimoji="1" lang="zh-CN" altLang="en-US" dirty="0" smtClean="0"/>
               <a:t>关闭</a:t>
+            </a:r>
+            <a:r>
+              <a:rPr kumimoji="1" lang="en-US" altLang="zh-CN" dirty="0" smtClean="0"/>
+              <a:t>&lt;input /&gt;</a:t>
             </a:r>
             <a:endParaRPr kumimoji="1" lang="en-US" altLang="zh-CN" dirty="0"/>
           </a:p>
@@ -17830,6 +17884,13 @@
   <p:clrMapOvr>
     <a:masterClrMapping/>
   </p:clrMapOvr>
+  <p:timing>
+    <p:tnLst>
+      <p:par>
+        <p:cTn id="1" dur="indefinite" restart="never" nodeType="tmRoot"/>
+      </p:par>
+    </p:tnLst>
+  </p:timing>
 </p:sld>
 </file>
 
@@ -17855,7 +17916,7 @@
           <p:cNvPr id="2" name="标题 1">
             <a:extLst>
               <a:ext uri="{FF2B5EF4-FFF2-40B4-BE49-F238E27FC236}">
-                <a16:creationId xmlns:a16="http://schemas.microsoft.com/office/drawing/2014/main" xmlns="" id="{8C046686-400C-7249-B9C3-541D4BB1F4B1}"/>
+                <a16:creationId xmlns="" xmlns:a16="http://schemas.microsoft.com/office/drawing/2014/main" id="{8C046686-400C-7249-B9C3-541D4BB1F4B1}"/>
               </a:ext>
             </a:extLst>
           </p:cNvPr>
@@ -17887,7 +17948,7 @@
           <p:cNvPr id="3" name="内容占位符 2">
             <a:extLst>
               <a:ext uri="{FF2B5EF4-FFF2-40B4-BE49-F238E27FC236}">
-                <a16:creationId xmlns:a16="http://schemas.microsoft.com/office/drawing/2014/main" xmlns="" id="{DB16EE3F-0F24-0A41-8215-349FF95EA393}"/>
+                <a16:creationId xmlns="" xmlns:a16="http://schemas.microsoft.com/office/drawing/2014/main" id="{DB16EE3F-0F24-0A41-8215-349FF95EA393}"/>
               </a:ext>
             </a:extLst>
           </p:cNvPr>
@@ -17970,6 +18031,13 @@
   <p:clrMapOvr>
     <a:masterClrMapping/>
   </p:clrMapOvr>
+  <p:timing>
+    <p:tnLst>
+      <p:par>
+        <p:cTn id="1" dur="indefinite" restart="never" nodeType="tmRoot"/>
+      </p:par>
+    </p:tnLst>
+  </p:timing>
 </p:sld>
 </file>
 
@@ -17995,7 +18063,7 @@
           <p:cNvPr id="2" name="标题 1">
             <a:extLst>
               <a:ext uri="{FF2B5EF4-FFF2-40B4-BE49-F238E27FC236}">
-                <a16:creationId xmlns:a16="http://schemas.microsoft.com/office/drawing/2014/main" xmlns="" id="{F1260208-2E81-0E4C-886E-A9819311D9B4}"/>
+                <a16:creationId xmlns="" xmlns:a16="http://schemas.microsoft.com/office/drawing/2014/main" id="{F1260208-2E81-0E4C-886E-A9819311D9B4}"/>
               </a:ext>
             </a:extLst>
           </p:cNvPr>
@@ -18031,7 +18099,7 @@
           <p:cNvPr id="3" name="内容占位符 2">
             <a:extLst>
               <a:ext uri="{FF2B5EF4-FFF2-40B4-BE49-F238E27FC236}">
-                <a16:creationId xmlns:a16="http://schemas.microsoft.com/office/drawing/2014/main" xmlns="" id="{0BCE9E21-195B-2246-897D-9B86B1589071}"/>
+                <a16:creationId xmlns="" xmlns:a16="http://schemas.microsoft.com/office/drawing/2014/main" id="{0BCE9E21-195B-2246-897D-9B86B1589071}"/>
               </a:ext>
             </a:extLst>
           </p:cNvPr>
@@ -18189,6 +18257,13 @@
   <p:clrMapOvr>
     <a:masterClrMapping/>
   </p:clrMapOvr>
+  <p:timing>
+    <p:tnLst>
+      <p:par>
+        <p:cTn id="1" dur="indefinite" restart="never" nodeType="tmRoot"/>
+      </p:par>
+    </p:tnLst>
+  </p:timing>
 </p:sld>
 </file>
 
@@ -18214,7 +18289,7 @@
           <p:cNvPr id="2" name="标题 1">
             <a:extLst>
               <a:ext uri="{FF2B5EF4-FFF2-40B4-BE49-F238E27FC236}">
-                <a16:creationId xmlns:a16="http://schemas.microsoft.com/office/drawing/2014/main" xmlns="" id="{F3D743D7-0FAD-244F-995F-FB2D2D9F7F7A}"/>
+                <a16:creationId xmlns="" xmlns:a16="http://schemas.microsoft.com/office/drawing/2014/main" id="{F3D743D7-0FAD-244F-995F-FB2D2D9F7F7A}"/>
               </a:ext>
             </a:extLst>
           </p:cNvPr>
@@ -18255,7 +18330,7 @@
           <p:cNvPr id="3" name="内容占位符 2">
             <a:extLst>
               <a:ext uri="{FF2B5EF4-FFF2-40B4-BE49-F238E27FC236}">
-                <a16:creationId xmlns:a16="http://schemas.microsoft.com/office/drawing/2014/main" xmlns="" id="{012B070B-7341-F04F-B2C1-DC740871DB29}"/>
+                <a16:creationId xmlns="" xmlns:a16="http://schemas.microsoft.com/office/drawing/2014/main" id="{012B070B-7341-F04F-B2C1-DC740871DB29}"/>
               </a:ext>
             </a:extLst>
           </p:cNvPr>
@@ -18345,7 +18420,7 @@
           <p:cNvPr id="4" name="表格 3">
             <a:extLst>
               <a:ext uri="{FF2B5EF4-FFF2-40B4-BE49-F238E27FC236}">
-                <a16:creationId xmlns:a16="http://schemas.microsoft.com/office/drawing/2014/main" xmlns="" id="{9FC7676C-F469-E14C-9FA5-002A3C27FE0A}"/>
+                <a16:creationId xmlns="" xmlns:a16="http://schemas.microsoft.com/office/drawing/2014/main" id="{9FC7676C-F469-E14C-9FA5-002A3C27FE0A}"/>
               </a:ext>
             </a:extLst>
           </p:cNvPr>
@@ -18374,14 +18449,14 @@
                 <a:gridCol w="5119130">
                   <a:extLst>
                     <a:ext uri="{9D8B030D-6E8A-4147-A177-3AD203B41FA5}">
-                      <a16:colId xmlns:a16="http://schemas.microsoft.com/office/drawing/2014/main" xmlns="" val="748921008"/>
+                      <a16:colId xmlns="" xmlns:a16="http://schemas.microsoft.com/office/drawing/2014/main" val="748921008"/>
                     </a:ext>
                   </a:extLst>
                 </a:gridCol>
                 <a:gridCol w="5119130">
                   <a:extLst>
                     <a:ext uri="{9D8B030D-6E8A-4147-A177-3AD203B41FA5}">
-                      <a16:colId xmlns:a16="http://schemas.microsoft.com/office/drawing/2014/main" xmlns="" val="3961909709"/>
+                      <a16:colId xmlns="" xmlns:a16="http://schemas.microsoft.com/office/drawing/2014/main" val="3961909709"/>
                     </a:ext>
                   </a:extLst>
                 </a:gridCol>
@@ -18415,7 +18490,7 @@
                 </a:tc>
                 <a:extLst>
                   <a:ext uri="{0D108BD9-81ED-4DB2-BD59-A6C34878D82A}">
-                    <a16:rowId xmlns:a16="http://schemas.microsoft.com/office/drawing/2014/main" xmlns="" val="2081860126"/>
+                    <a16:rowId xmlns="" xmlns:a16="http://schemas.microsoft.com/office/drawing/2014/main" val="2081860126"/>
                   </a:ext>
                 </a:extLst>
               </a:tr>
@@ -18449,7 +18524,7 @@
                 </a:tc>
                 <a:extLst>
                   <a:ext uri="{0D108BD9-81ED-4DB2-BD59-A6C34878D82A}">
-                    <a16:rowId xmlns:a16="http://schemas.microsoft.com/office/drawing/2014/main" xmlns="" val="3817384542"/>
+                    <a16:rowId xmlns="" xmlns:a16="http://schemas.microsoft.com/office/drawing/2014/main" val="3817384542"/>
                   </a:ext>
                 </a:extLst>
               </a:tr>
@@ -18491,7 +18566,7 @@
                 </a:tc>
                 <a:extLst>
                   <a:ext uri="{0D108BD9-81ED-4DB2-BD59-A6C34878D82A}">
-                    <a16:rowId xmlns:a16="http://schemas.microsoft.com/office/drawing/2014/main" xmlns="" val="3149108899"/>
+                    <a16:rowId xmlns="" xmlns:a16="http://schemas.microsoft.com/office/drawing/2014/main" val="3149108899"/>
                   </a:ext>
                 </a:extLst>
               </a:tr>
@@ -18525,7 +18600,7 @@
                 </a:tc>
                 <a:extLst>
                   <a:ext uri="{0D108BD9-81ED-4DB2-BD59-A6C34878D82A}">
-                    <a16:rowId xmlns:a16="http://schemas.microsoft.com/office/drawing/2014/main" xmlns="" val="1181931278"/>
+                    <a16:rowId xmlns="" xmlns:a16="http://schemas.microsoft.com/office/drawing/2014/main" val="1181931278"/>
                   </a:ext>
                 </a:extLst>
               </a:tr>
@@ -18559,7 +18634,7 @@
                 </a:tc>
                 <a:extLst>
                   <a:ext uri="{0D108BD9-81ED-4DB2-BD59-A6C34878D82A}">
-                    <a16:rowId xmlns:a16="http://schemas.microsoft.com/office/drawing/2014/main" xmlns="" val="3935439457"/>
+                    <a16:rowId xmlns="" xmlns:a16="http://schemas.microsoft.com/office/drawing/2014/main" val="3935439457"/>
                   </a:ext>
                 </a:extLst>
               </a:tr>
@@ -19116,7 +19191,7 @@
   <a:extraClrSchemeLst/>
   <a:extLst>
     <a:ext uri="{05A4C25C-085E-4340-85A3-A5531E510DB2}">
-      <thm15:themeFamily xmlns:thm15="http://schemas.microsoft.com/office/thememl/2012/main" xmlns="" name="Circuit" id="{0AC2F7E7-15F5-431C-B2A2-456FE929F56C}" vid="{0911B802-464C-4241-8DD9-B60FF88E379F}"/>
+      <thm15:themeFamily xmlns="" xmlns:thm15="http://schemas.microsoft.com/office/thememl/2012/main" name="Circuit" id="{0AC2F7E7-15F5-431C-B2A2-456FE929F56C}" vid="{0911B802-464C-4241-8DD9-B60FF88E379F}"/>
     </a:ext>
   </a:extLst>
 </a:theme>

</xml_diff>